<commit_message>
Added QuantumMechanics and ML lectures and other content
</commit_message>
<xml_diff>
--- a/slides/Lecture21-04-17-25-QuantumMechanics.pptx
+++ b/slides/Lecture21-04-17-25-QuantumMechanics.pptx
@@ -267,7 +267,7 @@
           <a:p>
             <a:fld id="{961AF02B-09B0-4980-983D-27C0EDB561B5}" type="datetimeFigureOut">
               <a:rPr lang="uk-UA" smtClean="0"/>
-              <a:t>17.04.25</a:t>
+              <a:t>24.04.25</a:t>
             </a:fld>
             <a:endParaRPr lang="uk-UA"/>
           </a:p>
@@ -6255,10 +6255,85 @@
       </p:pic>
       <p:sp>
         <p:nvSpPr>
-          <p:cNvPr id="9" name="TextBox 8">
-            <a:extLst>
-              <a:ext uri="{FF2B5EF4-FFF2-40B4-BE49-F238E27FC236}">
-                <a16:creationId xmlns:a16="http://schemas.microsoft.com/office/drawing/2014/main" id="{4ADF7582-D44D-F927-860D-231B612B2A3A}"/>
+          <p:cNvPr id="2" name="TextBox 1">
+            <a:extLst>
+              <a:ext uri="{FF2B5EF4-FFF2-40B4-BE49-F238E27FC236}">
+                <a16:creationId xmlns:a16="http://schemas.microsoft.com/office/drawing/2014/main" id="{51A2A970-40E9-7C81-D5CB-33C46F4855DC}"/>
+              </a:ext>
+            </a:extLst>
+          </p:cNvPr>
+          <p:cNvSpPr txBox="1"/>
+          <p:nvPr/>
+        </p:nvSpPr>
+        <p:spPr>
+          <a:xfrm>
+            <a:off x="2606566" y="3154741"/>
+            <a:ext cx="5663730" cy="1015663"/>
+          </a:xfrm>
+          <a:prstGeom prst="rect">
+            <a:avLst/>
+          </a:prstGeom>
+          <a:noFill/>
+        </p:spPr>
+        <p:txBody>
+          <a:bodyPr wrap="none" rtlCol="0">
+            <a:spAutoFit/>
+          </a:bodyPr>
+          <a:lstStyle/>
+          <a:p>
+            <a:pPr marL="285750" indent="-285750">
+              <a:buFont typeface="Arial" panose="020B0604020202020204" pitchFamily="34" charset="0"/>
+              <a:buChar char="•"/>
+            </a:pPr>
+            <a:r>
+              <a:rPr lang="en-US" sz="2000" dirty="0"/>
+              <a:t>Matrix method for </a:t>
+            </a:r>
+            <a:r>
+              <a:rPr lang="en-US" sz="2000" dirty="0" err="1"/>
+              <a:t>eigenenergies</a:t>
+            </a:r>
+            <a:r>
+              <a:rPr lang="en-US" sz="2000" dirty="0"/>
+              <a:t> and eigenstates</a:t>
+            </a:r>
+          </a:p>
+          <a:p>
+            <a:pPr marL="285750" indent="-285750">
+              <a:buFont typeface="Arial" panose="020B0604020202020204" pitchFamily="34" charset="0"/>
+              <a:buChar char="•"/>
+            </a:pPr>
+            <a:r>
+              <a:rPr lang="en-US" sz="2000" dirty="0"/>
+              <a:t>Time-dependent </a:t>
+            </a:r>
+            <a:r>
+              <a:rPr lang="en-US" sz="2000" dirty="0" err="1"/>
+              <a:t>Schroedinger</a:t>
+            </a:r>
+            <a:r>
+              <a:rPr lang="en-US" sz="2000" dirty="0"/>
+              <a:t> equation</a:t>
+            </a:r>
+          </a:p>
+          <a:p>
+            <a:pPr marL="285750" indent="-285750">
+              <a:buFont typeface="Arial" panose="020B0604020202020204" pitchFamily="34" charset="0"/>
+              <a:buChar char="•"/>
+            </a:pPr>
+            <a:r>
+              <a:rPr lang="en-US" sz="2000" dirty="0"/>
+              <a:t>Variational method</a:t>
+            </a:r>
+          </a:p>
+        </p:txBody>
+      </p:sp>
+      <p:sp>
+        <p:nvSpPr>
+          <p:cNvPr id="3" name="TextBox 2">
+            <a:extLst>
+              <a:ext uri="{FF2B5EF4-FFF2-40B4-BE49-F238E27FC236}">
+                <a16:creationId xmlns:a16="http://schemas.microsoft.com/office/drawing/2014/main" id="{B3192A4F-7E23-5ADE-77D6-C51243178FC1}"/>
               </a:ext>
             </a:extLst>
           </p:cNvPr>
@@ -6297,84 +6372,9 @@
               <a:rPr lang="en-US" dirty="0">
                 <a:hlinkClick r:id="rId5"/>
               </a:rPr>
-              <a:t>https://github.com/vlvovch/PHYS6350-ComputationalPhysics</a:t>
+              <a:t>https://github.com/vlvovch/PHYS6350-ComputationalPhysics/tree/spring2025</a:t>
             </a:r>
             <a:endParaRPr lang="en-US" dirty="0"/>
-          </a:p>
-        </p:txBody>
-      </p:sp>
-      <p:sp>
-        <p:nvSpPr>
-          <p:cNvPr id="2" name="TextBox 1">
-            <a:extLst>
-              <a:ext uri="{FF2B5EF4-FFF2-40B4-BE49-F238E27FC236}">
-                <a16:creationId xmlns:a16="http://schemas.microsoft.com/office/drawing/2014/main" id="{51A2A970-40E9-7C81-D5CB-33C46F4855DC}"/>
-              </a:ext>
-            </a:extLst>
-          </p:cNvPr>
-          <p:cNvSpPr txBox="1"/>
-          <p:nvPr/>
-        </p:nvSpPr>
-        <p:spPr>
-          <a:xfrm>
-            <a:off x="2606566" y="3154741"/>
-            <a:ext cx="5663730" cy="1015663"/>
-          </a:xfrm>
-          <a:prstGeom prst="rect">
-            <a:avLst/>
-          </a:prstGeom>
-          <a:noFill/>
-        </p:spPr>
-        <p:txBody>
-          <a:bodyPr wrap="none" rtlCol="0">
-            <a:spAutoFit/>
-          </a:bodyPr>
-          <a:lstStyle/>
-          <a:p>
-            <a:pPr marL="285750" indent="-285750">
-              <a:buFont typeface="Arial" panose="020B0604020202020204" pitchFamily="34" charset="0"/>
-              <a:buChar char="•"/>
-            </a:pPr>
-            <a:r>
-              <a:rPr lang="en-US" sz="2000" dirty="0"/>
-              <a:t>Matrix method for </a:t>
-            </a:r>
-            <a:r>
-              <a:rPr lang="en-US" sz="2000" dirty="0" err="1"/>
-              <a:t>eigenenergies</a:t>
-            </a:r>
-            <a:r>
-              <a:rPr lang="en-US" sz="2000" dirty="0"/>
-              <a:t> and eigenstates</a:t>
-            </a:r>
-          </a:p>
-          <a:p>
-            <a:pPr marL="285750" indent="-285750">
-              <a:buFont typeface="Arial" panose="020B0604020202020204" pitchFamily="34" charset="0"/>
-              <a:buChar char="•"/>
-            </a:pPr>
-            <a:r>
-              <a:rPr lang="en-US" sz="2000" dirty="0"/>
-              <a:t>Time-dependent </a:t>
-            </a:r>
-            <a:r>
-              <a:rPr lang="en-US" sz="2000" dirty="0" err="1"/>
-              <a:t>Schroedinger</a:t>
-            </a:r>
-            <a:r>
-              <a:rPr lang="en-US" sz="2000" dirty="0"/>
-              <a:t> equation</a:t>
-            </a:r>
-          </a:p>
-          <a:p>
-            <a:pPr marL="285750" indent="-285750">
-              <a:buFont typeface="Arial" panose="020B0604020202020204" pitchFamily="34" charset="0"/>
-              <a:buChar char="•"/>
-            </a:pPr>
-            <a:r>
-              <a:rPr lang="en-US" sz="2000" dirty="0"/>
-              <a:t>Variational method</a:t>
-            </a:r>
           </a:p>
         </p:txBody>
       </p:sp>
@@ -6709,8 +6709,8 @@
           </a:p>
         </p:txBody>
       </p:sp>
-      <mc:AlternateContent xmlns:mc="http://schemas.openxmlformats.org/markup-compatibility/2006">
-        <mc:Choice xmlns:a14="http://schemas.microsoft.com/office/drawing/2010/main" Requires="a14">
+      <mc:AlternateContent xmlns:mc="http://schemas.openxmlformats.org/markup-compatibility/2006" xmlns:a14="http://schemas.microsoft.com/office/drawing/2010/main">
+        <mc:Choice Requires="a14">
           <p:sp>
             <p:nvSpPr>
               <p:cNvPr id="10" name="TextBox 9">
@@ -6808,7 +6808,7 @@
             </p:txBody>
           </p:sp>
         </mc:Choice>
-        <mc:Fallback>
+        <mc:Fallback xmlns="">
           <p:sp>
             <p:nvSpPr>
               <p:cNvPr id="10" name="TextBox 9">
@@ -7890,8 +7890,8 @@
           </a:p>
         </p:txBody>
       </p:sp>
-      <mc:AlternateContent xmlns:mc="http://schemas.openxmlformats.org/markup-compatibility/2006">
-        <mc:Choice xmlns:a14="http://schemas.microsoft.com/office/drawing/2010/main" Requires="a14">
+      <mc:AlternateContent xmlns:mc="http://schemas.openxmlformats.org/markup-compatibility/2006" xmlns:a14="http://schemas.microsoft.com/office/drawing/2010/main">
+        <mc:Choice Requires="a14">
           <p:sp>
             <p:nvSpPr>
               <p:cNvPr id="5" name="TextBox 4">
@@ -7920,6 +7920,7 @@
               </a:bodyPr>
               <a:lstStyle/>
               <a:p>
+                <a:pPr/>
                 <a14:m>
                   <m:oMathPara xmlns:m="http://schemas.openxmlformats.org/officeDocument/2006/math">
                     <m:oMathParaPr>
@@ -8018,7 +8019,7 @@
             </p:txBody>
           </p:sp>
         </mc:Choice>
-        <mc:Fallback>
+        <mc:Fallback xmlns="">
           <p:sp>
             <p:nvSpPr>
               <p:cNvPr id="5" name="TextBox 4">
@@ -8098,8 +8099,8 @@
           </a:p>
         </p:txBody>
       </p:sp>
-      <mc:AlternateContent xmlns:mc="http://schemas.openxmlformats.org/markup-compatibility/2006">
-        <mc:Choice xmlns:a14="http://schemas.microsoft.com/office/drawing/2010/main" Requires="a14">
+      <mc:AlternateContent xmlns:mc="http://schemas.openxmlformats.org/markup-compatibility/2006" xmlns:a14="http://schemas.microsoft.com/office/drawing/2010/main">
+        <mc:Choice Requires="a14">
           <p:sp>
             <p:nvSpPr>
               <p:cNvPr id="7" name="TextBox 6">
@@ -8176,7 +8177,7 @@
             </p:txBody>
           </p:sp>
         </mc:Choice>
-        <mc:Fallback>
+        <mc:Fallback xmlns="">
           <p:sp>
             <p:nvSpPr>
               <p:cNvPr id="7" name="TextBox 6">
@@ -8286,8 +8287,8 @@
           </a:prstGeom>
         </p:spPr>
       </p:pic>
-      <mc:AlternateContent xmlns:mc="http://schemas.openxmlformats.org/markup-compatibility/2006">
-        <mc:Choice xmlns:a14="http://schemas.microsoft.com/office/drawing/2010/main" Requires="a14">
+      <mc:AlternateContent xmlns:mc="http://schemas.openxmlformats.org/markup-compatibility/2006" xmlns:a14="http://schemas.microsoft.com/office/drawing/2010/main">
+        <mc:Choice Requires="a14">
           <p:sp>
             <p:nvSpPr>
               <p:cNvPr id="10" name="TextBox 9">
@@ -8367,7 +8368,7 @@
             </p:txBody>
           </p:sp>
         </mc:Choice>
-        <mc:Fallback>
+        <mc:Fallback xmlns="">
           <p:sp>
             <p:nvSpPr>
               <p:cNvPr id="10" name="TextBox 9">
@@ -8412,8 +8413,8 @@
           </p:sp>
         </mc:Fallback>
       </mc:AlternateContent>
-      <mc:AlternateContent xmlns:mc="http://schemas.openxmlformats.org/markup-compatibility/2006">
-        <mc:Choice xmlns:a14="http://schemas.microsoft.com/office/drawing/2010/main" Requires="a14">
+      <mc:AlternateContent xmlns:mc="http://schemas.openxmlformats.org/markup-compatibility/2006" xmlns:a14="http://schemas.microsoft.com/office/drawing/2010/main">
+        <mc:Choice Requires="a14">
           <p:sp>
             <p:nvSpPr>
               <p:cNvPr id="11" name="TextBox 10">
@@ -8442,6 +8443,7 @@
               </a:bodyPr>
               <a:lstStyle/>
               <a:p>
+                <a:pPr/>
                 <a14:m>
                   <m:oMathPara xmlns:m="http://schemas.openxmlformats.org/officeDocument/2006/math">
                     <m:oMathParaPr>
@@ -8560,7 +8562,7 @@
             </p:txBody>
           </p:sp>
         </mc:Choice>
-        <mc:Fallback>
+        <mc:Fallback xmlns="">
           <p:sp>
             <p:nvSpPr>
               <p:cNvPr id="11" name="TextBox 10">
@@ -8605,8 +8607,8 @@
           </p:sp>
         </mc:Fallback>
       </mc:AlternateContent>
-      <mc:AlternateContent xmlns:mc="http://schemas.openxmlformats.org/markup-compatibility/2006">
-        <mc:Choice xmlns:a14="http://schemas.microsoft.com/office/drawing/2010/main" Requires="a14">
+      <mc:AlternateContent xmlns:mc="http://schemas.openxmlformats.org/markup-compatibility/2006" xmlns:a14="http://schemas.microsoft.com/office/drawing/2010/main">
+        <mc:Choice Requires="a14">
           <p:sp>
             <p:nvSpPr>
               <p:cNvPr id="13" name="TextBox 12">
@@ -8635,6 +8637,7 @@
               </a:bodyPr>
               <a:lstStyle/>
               <a:p>
+                <a:pPr/>
                 <a14:m>
                   <m:oMathPara xmlns:m="http://schemas.openxmlformats.org/officeDocument/2006/math">
                     <m:oMathParaPr>
@@ -8740,7 +8743,7 @@
             </p:txBody>
           </p:sp>
         </mc:Choice>
-        <mc:Fallback>
+        <mc:Fallback xmlns="">
           <p:sp>
             <p:nvSpPr>
               <p:cNvPr id="13" name="TextBox 12">
@@ -8785,8 +8788,8 @@
           </p:sp>
         </mc:Fallback>
       </mc:AlternateContent>
-      <mc:AlternateContent xmlns:mc="http://schemas.openxmlformats.org/markup-compatibility/2006">
-        <mc:Choice xmlns:a14="http://schemas.microsoft.com/office/drawing/2010/main" Requires="a14">
+      <mc:AlternateContent xmlns:mc="http://schemas.openxmlformats.org/markup-compatibility/2006" xmlns:a14="http://schemas.microsoft.com/office/drawing/2010/main">
+        <mc:Choice Requires="a14">
           <p:sp>
             <p:nvSpPr>
               <p:cNvPr id="14" name="TextBox 13">
@@ -8815,6 +8818,7 @@
               </a:bodyPr>
               <a:lstStyle/>
               <a:p>
+                <a:pPr/>
                 <a14:m>
                   <m:oMathPara xmlns:m="http://schemas.openxmlformats.org/officeDocument/2006/math">
                     <m:oMathParaPr>
@@ -8889,7 +8893,7 @@
             </p:txBody>
           </p:sp>
         </mc:Choice>
-        <mc:Fallback>
+        <mc:Fallback xmlns="">
           <p:sp>
             <p:nvSpPr>
               <p:cNvPr id="14" name="TextBox 13">
@@ -9275,8 +9279,8 @@
           </a:p>
         </p:txBody>
       </p:sp>
-      <mc:AlternateContent xmlns:mc="http://schemas.openxmlformats.org/markup-compatibility/2006">
-        <mc:Choice xmlns:a14="http://schemas.microsoft.com/office/drawing/2010/main" Requires="a14">
+      <mc:AlternateContent xmlns:mc="http://schemas.openxmlformats.org/markup-compatibility/2006" xmlns:a14="http://schemas.microsoft.com/office/drawing/2010/main">
+        <mc:Choice Requires="a14">
           <p:sp>
             <p:nvSpPr>
               <p:cNvPr id="22" name="TextBox 21">
@@ -9360,7 +9364,7 @@
             </p:txBody>
           </p:sp>
         </mc:Choice>
-        <mc:Fallback>
+        <mc:Fallback xmlns="">
           <p:sp>
             <p:nvSpPr>
               <p:cNvPr id="22" name="TextBox 21">
@@ -9510,8 +9514,8 @@
           </a:p>
         </p:txBody>
       </p:sp>
-      <mc:AlternateContent xmlns:mc="http://schemas.openxmlformats.org/markup-compatibility/2006">
-        <mc:Choice xmlns:a14="http://schemas.microsoft.com/office/drawing/2010/main" Requires="a14">
+      <mc:AlternateContent xmlns:mc="http://schemas.openxmlformats.org/markup-compatibility/2006" xmlns:a14="http://schemas.microsoft.com/office/drawing/2010/main">
+        <mc:Choice Requires="a14">
           <p:sp>
             <p:nvSpPr>
               <p:cNvPr id="28" name="TextBox 27">
@@ -9540,6 +9544,7 @@
               </a:bodyPr>
               <a:lstStyle/>
               <a:p>
+                <a:pPr/>
                 <a14:m>
                   <m:oMathPara xmlns:m="http://schemas.openxmlformats.org/officeDocument/2006/math">
                     <m:oMathParaPr>
@@ -9900,7 +9905,7 @@
             </p:txBody>
           </p:sp>
         </mc:Choice>
-        <mc:Fallback>
+        <mc:Fallback xmlns="">
           <p:sp>
             <p:nvSpPr>
               <p:cNvPr id="28" name="TextBox 27">
@@ -10603,8 +10608,8 @@
           </a:p>
         </p:txBody>
       </p:sp>
-      <mc:AlternateContent xmlns:mc="http://schemas.openxmlformats.org/markup-compatibility/2006">
-        <mc:Choice xmlns:a14="http://schemas.microsoft.com/office/drawing/2010/main" Requires="a14">
+      <mc:AlternateContent xmlns:mc="http://schemas.openxmlformats.org/markup-compatibility/2006" xmlns:a14="http://schemas.microsoft.com/office/drawing/2010/main">
+        <mc:Choice Requires="a14">
           <p:sp>
             <p:nvSpPr>
               <p:cNvPr id="10" name="TextBox 9">
@@ -10792,7 +10797,7 @@
             </p:txBody>
           </p:sp>
         </mc:Choice>
-        <mc:Fallback>
+        <mc:Fallback xmlns="">
           <p:sp>
             <p:nvSpPr>
               <p:cNvPr id="10" name="TextBox 9">
@@ -10837,8 +10842,8 @@
           </p:sp>
         </mc:Fallback>
       </mc:AlternateContent>
-      <mc:AlternateContent xmlns:mc="http://schemas.openxmlformats.org/markup-compatibility/2006">
-        <mc:Choice xmlns:a14="http://schemas.microsoft.com/office/drawing/2010/main" Requires="a14">
+      <mc:AlternateContent xmlns:mc="http://schemas.openxmlformats.org/markup-compatibility/2006" xmlns:a14="http://schemas.microsoft.com/office/drawing/2010/main">
+        <mc:Choice Requires="a14">
           <p:sp>
             <p:nvSpPr>
               <p:cNvPr id="11" name="TextBox 10">
@@ -10867,6 +10872,7 @@
               </a:bodyPr>
               <a:lstStyle/>
               <a:p>
+                <a:pPr/>
                 <a14:m>
                   <m:oMathPara xmlns:m="http://schemas.openxmlformats.org/officeDocument/2006/math">
                     <m:oMathParaPr>
@@ -10923,7 +10929,7 @@
             </p:txBody>
           </p:sp>
         </mc:Choice>
-        <mc:Fallback>
+        <mc:Fallback xmlns="">
           <p:sp>
             <p:nvSpPr>
               <p:cNvPr id="11" name="TextBox 10">
@@ -10998,8 +11004,8 @@
           </a:prstGeom>
         </p:spPr>
       </p:pic>
-      <mc:AlternateContent xmlns:mc="http://schemas.openxmlformats.org/markup-compatibility/2006">
-        <mc:Choice xmlns:a14="http://schemas.microsoft.com/office/drawing/2010/main" Requires="a14">
+      <mc:AlternateContent xmlns:mc="http://schemas.openxmlformats.org/markup-compatibility/2006" xmlns:a14="http://schemas.microsoft.com/office/drawing/2010/main">
+        <mc:Choice Requires="a14">
           <p:sp>
             <p:nvSpPr>
               <p:cNvPr id="21" name="TextBox 20">
@@ -11086,7 +11092,7 @@
             </p:txBody>
           </p:sp>
         </mc:Choice>
-        <mc:Fallback>
+        <mc:Fallback xmlns="">
           <p:sp>
             <p:nvSpPr>
               <p:cNvPr id="21" name="TextBox 20">
@@ -11131,8 +11137,8 @@
           </p:sp>
         </mc:Fallback>
       </mc:AlternateContent>
-      <mc:AlternateContent xmlns:mc="http://schemas.openxmlformats.org/markup-compatibility/2006">
-        <mc:Choice xmlns:a14="http://schemas.microsoft.com/office/drawing/2010/main" Requires="a14">
+      <mc:AlternateContent xmlns:mc="http://schemas.openxmlformats.org/markup-compatibility/2006" xmlns:a14="http://schemas.microsoft.com/office/drawing/2010/main">
+        <mc:Choice Requires="a14">
           <p:sp>
             <p:nvSpPr>
               <p:cNvPr id="23" name="TextBox 22">
@@ -11213,7 +11219,7 @@
             </p:txBody>
           </p:sp>
         </mc:Choice>
-        <mc:Fallback>
+        <mc:Fallback xmlns="">
           <p:sp>
             <p:nvSpPr>
               <p:cNvPr id="23" name="TextBox 22">
@@ -11490,8 +11496,8 @@
           </a:prstGeom>
         </p:spPr>
       </p:pic>
-      <mc:AlternateContent xmlns:mc="http://schemas.openxmlformats.org/markup-compatibility/2006">
-        <mc:Choice xmlns:a14="http://schemas.microsoft.com/office/drawing/2010/main" Requires="a14">
+      <mc:AlternateContent xmlns:mc="http://schemas.openxmlformats.org/markup-compatibility/2006" xmlns:a14="http://schemas.microsoft.com/office/drawing/2010/main">
+        <mc:Choice Requires="a14">
           <p:sp>
             <p:nvSpPr>
               <p:cNvPr id="18" name="TextBox 17">
@@ -11554,7 +11560,7 @@
             </p:txBody>
           </p:sp>
         </mc:Choice>
-        <mc:Fallback>
+        <mc:Fallback xmlns="">
           <p:sp>
             <p:nvSpPr>
               <p:cNvPr id="18" name="TextBox 17">
@@ -12428,8 +12434,8 @@
           </a:prstGeom>
         </p:spPr>
       </p:pic>
-      <mc:AlternateContent xmlns:mc="http://schemas.openxmlformats.org/markup-compatibility/2006">
-        <mc:Choice xmlns:a14="http://schemas.microsoft.com/office/drawing/2010/main" Requires="a14">
+      <mc:AlternateContent xmlns:mc="http://schemas.openxmlformats.org/markup-compatibility/2006" xmlns:a14="http://schemas.microsoft.com/office/drawing/2010/main">
+        <mc:Choice Requires="a14">
           <p:sp>
             <p:nvSpPr>
               <p:cNvPr id="7" name="TextBox 6">
@@ -12508,7 +12514,7 @@
             </p:txBody>
           </p:sp>
         </mc:Choice>
-        <mc:Fallback>
+        <mc:Fallback xmlns="">
           <p:sp>
             <p:nvSpPr>
               <p:cNvPr id="7" name="TextBox 6">
@@ -12618,8 +12624,8 @@
           </a:prstGeom>
         </p:spPr>
       </p:pic>
-      <mc:AlternateContent xmlns:mc="http://schemas.openxmlformats.org/markup-compatibility/2006">
-        <mc:Choice xmlns:a14="http://schemas.microsoft.com/office/drawing/2010/main" Requires="a14">
+      <mc:AlternateContent xmlns:mc="http://schemas.openxmlformats.org/markup-compatibility/2006" xmlns:a14="http://schemas.microsoft.com/office/drawing/2010/main">
+        <mc:Choice Requires="a14">
           <p:sp>
             <p:nvSpPr>
               <p:cNvPr id="10" name="TextBox 9">
@@ -12705,7 +12711,7 @@
             </p:txBody>
           </p:sp>
         </mc:Choice>
-        <mc:Fallback>
+        <mc:Fallback xmlns="">
           <p:sp>
             <p:nvSpPr>
               <p:cNvPr id="10" name="TextBox 9">
@@ -13799,8 +13805,8 @@
           </a:p>
         </p:txBody>
       </p:sp>
-      <mc:AlternateContent xmlns:mc="http://schemas.openxmlformats.org/markup-compatibility/2006">
-        <mc:Choice xmlns:a14="http://schemas.microsoft.com/office/drawing/2010/main" Requires="a14">
+      <mc:AlternateContent xmlns:mc="http://schemas.openxmlformats.org/markup-compatibility/2006" xmlns:a14="http://schemas.microsoft.com/office/drawing/2010/main">
+        <mc:Choice Requires="a14">
           <p:sp>
             <p:nvSpPr>
               <p:cNvPr id="11" name="TextBox 10">
@@ -13829,6 +13835,7 @@
               </a:bodyPr>
               <a:lstStyle/>
               <a:p>
+                <a:pPr/>
                 <a14:m>
                   <m:oMathPara xmlns:m="http://schemas.openxmlformats.org/officeDocument/2006/math">
                     <m:oMathParaPr>
@@ -13885,7 +13892,7 @@
             </p:txBody>
           </p:sp>
         </mc:Choice>
-        <mc:Fallback>
+        <mc:Fallback xmlns="">
           <p:sp>
             <p:nvSpPr>
               <p:cNvPr id="11" name="TextBox 10">
@@ -15034,8 +15041,8 @@
           </a:p>
         </p:txBody>
       </p:sp>
-      <mc:AlternateContent xmlns:mc="http://schemas.openxmlformats.org/markup-compatibility/2006">
-        <mc:Choice xmlns:a14="http://schemas.microsoft.com/office/drawing/2010/main" Requires="a14">
+      <mc:AlternateContent xmlns:mc="http://schemas.openxmlformats.org/markup-compatibility/2006" xmlns:a14="http://schemas.microsoft.com/office/drawing/2010/main">
+        <mc:Choice Requires="a14">
           <p:sp>
             <p:nvSpPr>
               <p:cNvPr id="25" name="TextBox 24">
@@ -15064,6 +15071,7 @@
               </a:bodyPr>
               <a:lstStyle/>
               <a:p>
+                <a:pPr/>
                 <a14:m>
                   <m:oMathPara xmlns:m="http://schemas.openxmlformats.org/officeDocument/2006/math">
                     <m:oMathParaPr>
@@ -15135,7 +15143,7 @@
             </p:txBody>
           </p:sp>
         </mc:Choice>
-        <mc:Fallback>
+        <mc:Fallback xmlns="">
           <p:sp>
             <p:nvSpPr>
               <p:cNvPr id="25" name="TextBox 24">

</xml_diff>